<commit_message>
well... it's been a while
i never seem to have committed this... it's never too late right?
</commit_message>
<xml_diff>
--- a/codeforgood.pptx
+++ b/codeforgood.pptx
@@ -4665,17 +4665,8 @@
             </a:r>
             <a:r>
               <a:rPr lang="en-US" dirty="0" smtClean="0"/>
-              <a:t>, </a:t>
-            </a:r>
-            <a:r>
-              <a:rPr lang="en-US" dirty="0" smtClean="0"/>
-              <a:t>Han </a:t>
-            </a:r>
-            <a:r>
-              <a:rPr lang="en-US" dirty="0" smtClean="0"/>
-              <a:t>Thu, </a:t>
-            </a:r>
-            <a:endParaRPr lang="en-US" dirty="0" smtClean="0"/>
+              <a:t>, Han Thu, </a:t>
+            </a:r>
           </a:p>
           <a:p>
             <a:r>
@@ -4754,21 +4745,12 @@
               <a:rPr lang="en-US" dirty="0" smtClean="0"/>
               <a:t>To save the staff the time and effort of reading through hundreds of emails each week</a:t>
             </a:r>
-            <a:endParaRPr lang="en-US" dirty="0" smtClean="0"/>
           </a:p>
           <a:p>
             <a:pPr lvl="1"/>
             <a:r>
               <a:rPr lang="en-US" dirty="0" smtClean="0"/>
-              <a:t>Implement an algorithm </a:t>
-            </a:r>
-            <a:r>
-              <a:rPr lang="en-US" dirty="0" smtClean="0"/>
-              <a:t>that produces an accurate score for email/curriculum </a:t>
-            </a:r>
-            <a:r>
-              <a:rPr lang="en-US" dirty="0" smtClean="0"/>
-              <a:t>pairs</a:t>
+              <a:t>Implement an algorithm that produces an accurate score for email/curriculum pairs</a:t>
             </a:r>
           </a:p>
           <a:p>
@@ -4784,7 +4766,6 @@
               <a:rPr lang="en-US" dirty="0" smtClean="0"/>
               <a:t> to easily visualize data</a:t>
             </a:r>
-            <a:endParaRPr lang="en-US" dirty="0" smtClean="0"/>
           </a:p>
           <a:p>
             <a:pPr lvl="1"/>
@@ -4829,11 +4810,7 @@
           <a:p>
             <a:r>
               <a:rPr lang="en-US" dirty="0" smtClean="0"/>
-              <a:t>Goals </a:t>
-            </a:r>
-            <a:r>
-              <a:rPr lang="en-US" dirty="0" smtClean="0"/>
-              <a:t>and Approach</a:t>
+              <a:t>Goals and Approach</a:t>
             </a:r>
             <a:endParaRPr lang="en-US" dirty="0"/>
           </a:p>
@@ -5067,11 +5044,19 @@
             <a:pPr lvl="1"/>
             <a:r>
               <a:rPr lang="en-US" dirty="0" smtClean="0"/>
-              <a:t>Training data for </a:t>
+              <a:t>More </a:t>
+            </a:r>
+            <a:r>
+              <a:rPr lang="en-US" smtClean="0"/>
+              <a:t>sample anonymized </a:t>
             </a:r>
             <a:r>
               <a:rPr lang="en-US" dirty="0" smtClean="0"/>
-              <a:t>algorithm</a:t>
+              <a:t>data </a:t>
+            </a:r>
+            <a:r>
+              <a:rPr lang="en-US" dirty="0" smtClean="0"/>
+              <a:t>for algorithm</a:t>
             </a:r>
           </a:p>
           <a:p>
@@ -5080,7 +5065,6 @@
               <a:rPr lang="en-US" dirty="0" smtClean="0"/>
               <a:t>Better html sanitization</a:t>
             </a:r>
-            <a:endParaRPr lang="en-US" dirty="0" smtClean="0"/>
           </a:p>
           <a:p>
             <a:r>

</xml_diff>